<commit_message>
Added .DS_Store to .gitignore
</commit_message>
<xml_diff>
--- a/Module3/M3project/presentation/Presentation_CAS_ADP_20231008_sebastian_avisek.pptx
+++ b/Module3/M3project/presentation/Presentation_CAS_ADP_20231008_sebastian_avisek.pptx
@@ -211,7 +211,7 @@
           <a:p>
             <a:fld id="{A13D446D-6055-4C17-94E2-8BF8D8B2544B}" type="datetimeFigureOut">
               <a:rPr lang="en-GB" smtClean="0"/>
-              <a:t>08/10/2023</a:t>
+              <a:t>02/11/2023</a:t>
             </a:fld>
             <a:endParaRPr lang="en-GB" dirty="0"/>
           </a:p>
@@ -370,7 +370,7 @@
           <a:p>
             <a:fld id="{129DA8EC-31AD-4427-8D75-2F45F8B68E4D}" type="slidenum">
               <a:rPr lang="en-GB" smtClean="0"/>
-              <a:t>‹Nr.›</a:t>
+              <a:t>‹#›</a:t>
             </a:fld>
             <a:endParaRPr lang="en-GB" dirty="0"/>
           </a:p>
@@ -712,7 +712,7 @@
           <a:p>
             <a:fld id="{83009584-9C1B-4F77-A5D7-6D3C9B19F980}" type="datetimeFigureOut">
               <a:rPr lang="en-US" smtClean="0"/>
-              <a:t>10/8/2023</a:t>
+              <a:t>11/2/23</a:t>
             </a:fld>
             <a:endParaRPr lang="en-US" dirty="0"/>
           </a:p>
@@ -766,7 +766,7 @@
           <a:p>
             <a:fld id="{7F6C5BFA-BCA2-4632-BE1B-62B460272F1F}" type="slidenum">
               <a:rPr lang="en-US" smtClean="0"/>
-              <a:t>‹Nr.›</a:t>
+              <a:t>‹#›</a:t>
             </a:fld>
             <a:endParaRPr lang="en-US" dirty="0"/>
           </a:p>
@@ -912,7 +912,7 @@
           <a:p>
             <a:fld id="{83009584-9C1B-4F77-A5D7-6D3C9B19F980}" type="datetimeFigureOut">
               <a:rPr lang="en-US" smtClean="0"/>
-              <a:t>10/8/2023</a:t>
+              <a:t>11/2/23</a:t>
             </a:fld>
             <a:endParaRPr lang="en-US" dirty="0"/>
           </a:p>
@@ -966,7 +966,7 @@
           <a:p>
             <a:fld id="{7F6C5BFA-BCA2-4632-BE1B-62B460272F1F}" type="slidenum">
               <a:rPr lang="en-US" smtClean="0"/>
-              <a:t>‹Nr.›</a:t>
+              <a:t>‹#›</a:t>
             </a:fld>
             <a:endParaRPr lang="en-US" dirty="0"/>
           </a:p>
@@ -1122,7 +1122,7 @@
           <a:p>
             <a:fld id="{83009584-9C1B-4F77-A5D7-6D3C9B19F980}" type="datetimeFigureOut">
               <a:rPr lang="en-US" smtClean="0"/>
-              <a:t>10/8/2023</a:t>
+              <a:t>11/2/23</a:t>
             </a:fld>
             <a:endParaRPr lang="en-US" dirty="0"/>
           </a:p>
@@ -1176,7 +1176,7 @@
           <a:p>
             <a:fld id="{7F6C5BFA-BCA2-4632-BE1B-62B460272F1F}" type="slidenum">
               <a:rPr lang="en-US" smtClean="0"/>
-              <a:t>‹Nr.›</a:t>
+              <a:t>‹#›</a:t>
             </a:fld>
             <a:endParaRPr lang="en-US" dirty="0"/>
           </a:p>
@@ -1322,7 +1322,7 @@
           <a:p>
             <a:fld id="{83009584-9C1B-4F77-A5D7-6D3C9B19F980}" type="datetimeFigureOut">
               <a:rPr lang="en-US" smtClean="0"/>
-              <a:t>10/8/2023</a:t>
+              <a:t>11/2/23</a:t>
             </a:fld>
             <a:endParaRPr lang="en-US" dirty="0"/>
           </a:p>
@@ -1376,7 +1376,7 @@
           <a:p>
             <a:fld id="{7F6C5BFA-BCA2-4632-BE1B-62B460272F1F}" type="slidenum">
               <a:rPr lang="en-US" smtClean="0"/>
-              <a:t>‹Nr.›</a:t>
+              <a:t>‹#›</a:t>
             </a:fld>
             <a:endParaRPr lang="en-US" dirty="0"/>
           </a:p>
@@ -1598,7 +1598,7 @@
           <a:p>
             <a:fld id="{83009584-9C1B-4F77-A5D7-6D3C9B19F980}" type="datetimeFigureOut">
               <a:rPr lang="en-US" smtClean="0"/>
-              <a:t>10/8/2023</a:t>
+              <a:t>11/2/23</a:t>
             </a:fld>
             <a:endParaRPr lang="en-US" dirty="0"/>
           </a:p>
@@ -1652,7 +1652,7 @@
           <a:p>
             <a:fld id="{7F6C5BFA-BCA2-4632-BE1B-62B460272F1F}" type="slidenum">
               <a:rPr lang="en-US" smtClean="0"/>
-              <a:t>‹Nr.›</a:t>
+              <a:t>‹#›</a:t>
             </a:fld>
             <a:endParaRPr lang="en-US" dirty="0"/>
           </a:p>
@@ -1866,7 +1866,7 @@
           <a:p>
             <a:fld id="{83009584-9C1B-4F77-A5D7-6D3C9B19F980}" type="datetimeFigureOut">
               <a:rPr lang="en-US" smtClean="0"/>
-              <a:t>10/8/2023</a:t>
+              <a:t>11/2/23</a:t>
             </a:fld>
             <a:endParaRPr lang="en-US" dirty="0"/>
           </a:p>
@@ -1920,7 +1920,7 @@
           <a:p>
             <a:fld id="{7F6C5BFA-BCA2-4632-BE1B-62B460272F1F}" type="slidenum">
               <a:rPr lang="en-US" smtClean="0"/>
-              <a:t>‹Nr.›</a:t>
+              <a:t>‹#›</a:t>
             </a:fld>
             <a:endParaRPr lang="en-US" dirty="0"/>
           </a:p>
@@ -2281,7 +2281,7 @@
           <a:p>
             <a:fld id="{83009584-9C1B-4F77-A5D7-6D3C9B19F980}" type="datetimeFigureOut">
               <a:rPr lang="en-US" smtClean="0"/>
-              <a:t>10/8/2023</a:t>
+              <a:t>11/2/23</a:t>
             </a:fld>
             <a:endParaRPr lang="en-US" dirty="0"/>
           </a:p>
@@ -2335,7 +2335,7 @@
           <a:p>
             <a:fld id="{7F6C5BFA-BCA2-4632-BE1B-62B460272F1F}" type="slidenum">
               <a:rPr lang="en-US" smtClean="0"/>
-              <a:t>‹Nr.›</a:t>
+              <a:t>‹#›</a:t>
             </a:fld>
             <a:endParaRPr lang="en-US" dirty="0"/>
           </a:p>
@@ -2423,7 +2423,7 @@
           <a:p>
             <a:fld id="{83009584-9C1B-4F77-A5D7-6D3C9B19F980}" type="datetimeFigureOut">
               <a:rPr lang="en-US" smtClean="0"/>
-              <a:t>10/8/2023</a:t>
+              <a:t>11/2/23</a:t>
             </a:fld>
             <a:endParaRPr lang="en-US" dirty="0"/>
           </a:p>
@@ -2477,7 +2477,7 @@
           <a:p>
             <a:fld id="{7F6C5BFA-BCA2-4632-BE1B-62B460272F1F}" type="slidenum">
               <a:rPr lang="en-US" smtClean="0"/>
-              <a:t>‹Nr.›</a:t>
+              <a:t>‹#›</a:t>
             </a:fld>
             <a:endParaRPr lang="en-US" dirty="0"/>
           </a:p>
@@ -2536,7 +2536,7 @@
           <a:p>
             <a:fld id="{83009584-9C1B-4F77-A5D7-6D3C9B19F980}" type="datetimeFigureOut">
               <a:rPr lang="en-US" smtClean="0"/>
-              <a:t>10/8/2023</a:t>
+              <a:t>11/2/23</a:t>
             </a:fld>
             <a:endParaRPr lang="en-US" dirty="0"/>
           </a:p>
@@ -2590,7 +2590,7 @@
           <a:p>
             <a:fld id="{7F6C5BFA-BCA2-4632-BE1B-62B460272F1F}" type="slidenum">
               <a:rPr lang="en-US" smtClean="0"/>
-              <a:t>‹Nr.›</a:t>
+              <a:t>‹#›</a:t>
             </a:fld>
             <a:endParaRPr lang="en-US" dirty="0"/>
           </a:p>
@@ -2849,7 +2849,7 @@
           <a:p>
             <a:fld id="{83009584-9C1B-4F77-A5D7-6D3C9B19F980}" type="datetimeFigureOut">
               <a:rPr lang="en-US" smtClean="0"/>
-              <a:t>10/8/2023</a:t>
+              <a:t>11/2/23</a:t>
             </a:fld>
             <a:endParaRPr lang="en-US" dirty="0"/>
           </a:p>
@@ -2903,7 +2903,7 @@
           <a:p>
             <a:fld id="{7F6C5BFA-BCA2-4632-BE1B-62B460272F1F}" type="slidenum">
               <a:rPr lang="en-US" smtClean="0"/>
-              <a:t>‹Nr.›</a:t>
+              <a:t>‹#›</a:t>
             </a:fld>
             <a:endParaRPr lang="en-US" dirty="0"/>
           </a:p>
@@ -3138,7 +3138,7 @@
           <a:p>
             <a:fld id="{83009584-9C1B-4F77-A5D7-6D3C9B19F980}" type="datetimeFigureOut">
               <a:rPr lang="en-US" smtClean="0"/>
-              <a:t>10/8/2023</a:t>
+              <a:t>11/2/23</a:t>
             </a:fld>
             <a:endParaRPr lang="en-US" dirty="0"/>
           </a:p>
@@ -3192,7 +3192,7 @@
           <a:p>
             <a:fld id="{7F6C5BFA-BCA2-4632-BE1B-62B460272F1F}" type="slidenum">
               <a:rPr lang="en-US" smtClean="0"/>
-              <a:t>‹Nr.›</a:t>
+              <a:t>‹#›</a:t>
             </a:fld>
             <a:endParaRPr lang="en-US" dirty="0"/>
           </a:p>
@@ -3381,7 +3381,7 @@
           <a:p>
             <a:fld id="{83009584-9C1B-4F77-A5D7-6D3C9B19F980}" type="datetimeFigureOut">
               <a:rPr lang="en-US" smtClean="0"/>
-              <a:t>10/8/2023</a:t>
+              <a:t>11/2/23</a:t>
             </a:fld>
             <a:endParaRPr lang="en-US" dirty="0"/>
           </a:p>
@@ -3471,7 +3471,7 @@
           <a:p>
             <a:fld id="{7F6C5BFA-BCA2-4632-BE1B-62B460272F1F}" type="slidenum">
               <a:rPr lang="en-US" smtClean="0"/>
-              <a:t>‹Nr.›</a:t>
+              <a:t>‹#›</a:t>
             </a:fld>
             <a:endParaRPr lang="en-US" dirty="0"/>
           </a:p>
@@ -3881,7 +3881,7 @@
           <p:nvPr/>
         </p:nvPicPr>
         <p:blipFill>
-          <a:blip r:embed="rId3">
+          <a:blip>
             <a:extLst>
               <a:ext uri="{28A0092B-C50C-407E-A947-70E740481C1C}">
                 <a14:useLocalDpi xmlns:a14="http://schemas.microsoft.com/office/drawing/2010/main" val="0"/>
@@ -4308,7 +4308,7 @@
           <p:nvPr/>
         </p:nvPicPr>
         <p:blipFill>
-          <a:blip r:embed="rId4" cstate="hqprint">
+          <a:blip cstate="hqprint">
             <a:extLst>
               <a:ext uri="{28A0092B-C50C-407E-A947-70E740481C1C}">
                 <a14:useLocalDpi xmlns:a14="http://schemas.microsoft.com/office/drawing/2010/main" val="0"/>
@@ -4344,7 +4344,7 @@
           <p:nvPr/>
         </p:nvPicPr>
         <p:blipFill>
-          <a:blip r:embed="rId5" cstate="hqprint">
+          <a:blip cstate="hqprint">
             <a:extLst>
               <a:ext uri="{28A0092B-C50C-407E-A947-70E740481C1C}">
                 <a14:useLocalDpi xmlns:a14="http://schemas.microsoft.com/office/drawing/2010/main" val="0"/>
@@ -4434,7 +4434,7 @@
           <p:nvPr/>
         </p:nvPicPr>
         <p:blipFill>
-          <a:blip r:embed="rId6" cstate="hqprint">
+          <a:blip cstate="hqprint">
             <a:extLst>
               <a:ext uri="{28A0092B-C50C-407E-A947-70E740481C1C}">
                 <a14:useLocalDpi xmlns:a14="http://schemas.microsoft.com/office/drawing/2010/main" val="0"/>
@@ -4494,7 +4494,7 @@
           <p:nvPr/>
         </p:nvPicPr>
         <p:blipFill rotWithShape="1">
-          <a:blip r:embed="rId2">
+          <a:blip>
             <a:extLst>
               <a:ext uri="{28A0092B-C50C-407E-A947-70E740481C1C}">
                 <a14:useLocalDpi xmlns:a14="http://schemas.microsoft.com/office/drawing/2010/main" val="0"/>
@@ -4523,7 +4523,7 @@
           <p:nvPr/>
         </p:nvPicPr>
         <p:blipFill rotWithShape="1">
-          <a:blip r:embed="rId3">
+          <a:blip>
             <a:extLst>
               <a:ext uri="{28A0092B-C50C-407E-A947-70E740481C1C}">
                 <a14:useLocalDpi xmlns:a14="http://schemas.microsoft.com/office/drawing/2010/main" val="0"/>
@@ -11827,7 +11827,7 @@
           </p:nvPr>
         </p:nvPicPr>
         <p:blipFill rotWithShape="1">
-          <a:blip r:embed="rId2">
+          <a:blip>
             <a:extLst>
               <a:ext uri="{28A0092B-C50C-407E-A947-70E740481C1C}">
                 <a14:useLocalDpi xmlns:a14="http://schemas.microsoft.com/office/drawing/2010/main" val="0"/>
@@ -11853,7 +11853,7 @@
           <p:nvPr/>
         </p:nvPicPr>
         <p:blipFill rotWithShape="1">
-          <a:blip r:embed="rId2">
+          <a:blip>
             <a:extLst>
               <a:ext uri="{28A0092B-C50C-407E-A947-70E740481C1C}">
                 <a14:useLocalDpi xmlns:a14="http://schemas.microsoft.com/office/drawing/2010/main" val="0"/>
@@ -11957,7 +11957,7 @@
           </p:nvPr>
         </p:nvPicPr>
         <p:blipFill rotWithShape="1">
-          <a:blip r:embed="rId2">
+          <a:blip>
             <a:extLst>
               <a:ext uri="{28A0092B-C50C-407E-A947-70E740481C1C}">
                 <a14:useLocalDpi xmlns:a14="http://schemas.microsoft.com/office/drawing/2010/main" val="0"/>
@@ -11983,7 +11983,7 @@
           <p:nvPr/>
         </p:nvPicPr>
         <p:blipFill rotWithShape="1">
-          <a:blip r:embed="rId3">
+          <a:blip>
             <a:extLst>
               <a:ext uri="{28A0092B-C50C-407E-A947-70E740481C1C}">
                 <a14:useLocalDpi xmlns:a14="http://schemas.microsoft.com/office/drawing/2010/main" val="0"/>
@@ -20832,7 +20832,7 @@
           </p:nvPr>
         </p:nvPicPr>
         <p:blipFill rotWithShape="1">
-          <a:blip r:embed="rId2">
+          <a:blip>
             <a:extLst>
               <a:ext uri="{28A0092B-C50C-407E-A947-70E740481C1C}">
                 <a14:useLocalDpi xmlns:a14="http://schemas.microsoft.com/office/drawing/2010/main" val="0"/>
@@ -20858,7 +20858,7 @@
           <p:nvPr/>
         </p:nvPicPr>
         <p:blipFill rotWithShape="1">
-          <a:blip r:embed="rId3">
+          <a:blip>
             <a:extLst>
               <a:ext uri="{28A0092B-C50C-407E-A947-70E740481C1C}">
                 <a14:useLocalDpi xmlns:a14="http://schemas.microsoft.com/office/drawing/2010/main" val="0"/>
@@ -21990,7 +21990,7 @@
           <p:nvPr/>
         </p:nvPicPr>
         <p:blipFill rotWithShape="1">
-          <a:blip r:embed="rId2">
+          <a:blip>
             <a:extLst>
               <a:ext uri="{28A0092B-C50C-407E-A947-70E740481C1C}">
                 <a14:useLocalDpi xmlns:a14="http://schemas.microsoft.com/office/drawing/2010/main" val="0"/>
@@ -22019,7 +22019,7 @@
           <p:nvPr/>
         </p:nvPicPr>
         <p:blipFill rotWithShape="1">
-          <a:blip r:embed="rId2">
+          <a:blip>
             <a:extLst>
               <a:ext uri="{28A0092B-C50C-407E-A947-70E740481C1C}">
                 <a14:useLocalDpi xmlns:a14="http://schemas.microsoft.com/office/drawing/2010/main" val="0"/>
@@ -22048,7 +22048,7 @@
           <p:nvPr/>
         </p:nvPicPr>
         <p:blipFill rotWithShape="1">
-          <a:blip r:embed="rId2">
+          <a:blip>
             <a:extLst>
               <a:ext uri="{28A0092B-C50C-407E-A947-70E740481C1C}">
                 <a14:useLocalDpi xmlns:a14="http://schemas.microsoft.com/office/drawing/2010/main" val="0"/>
@@ -22235,7 +22235,7 @@
             </a:r>
             <a:r>
               <a:rPr lang="en-US" dirty="0" err="1"/>
-              <a:t>overdeepenings</a:t>
+              <a:t>overdeepening</a:t>
             </a:r>
             <a:endParaRPr lang="en-US" dirty="0"/>
           </a:p>
@@ -22436,7 +22436,7 @@
           </p:nvPr>
         </p:nvPicPr>
         <p:blipFill rotWithShape="1">
-          <a:blip r:embed="rId2">
+          <a:blip>
             <a:extLst>
               <a:ext uri="{28A0092B-C50C-407E-A947-70E740481C1C}">
                 <a14:useLocalDpi xmlns:a14="http://schemas.microsoft.com/office/drawing/2010/main" val="0"/>
@@ -22462,7 +22462,7 @@
           <p:nvPr/>
         </p:nvPicPr>
         <p:blipFill rotWithShape="1">
-          <a:blip r:embed="rId2">
+          <a:blip>
             <a:extLst>
               <a:ext uri="{28A0092B-C50C-407E-A947-70E740481C1C}">
                 <a14:useLocalDpi xmlns:a14="http://schemas.microsoft.com/office/drawing/2010/main" val="0"/>
@@ -22505,7 +22505,7 @@
             <p:nvPr/>
           </p:nvPicPr>
           <p:blipFill rotWithShape="1">
-            <a:blip r:embed="rId3">
+            <a:blip>
               <a:extLst>
                 <a:ext uri="{28A0092B-C50C-407E-A947-70E740481C1C}">
                   <a14:useLocalDpi xmlns:a14="http://schemas.microsoft.com/office/drawing/2010/main" val="0"/>
@@ -22626,7 +22626,7 @@
             <p:nvPr/>
           </p:nvPicPr>
           <p:blipFill rotWithShape="1">
-            <a:blip r:embed="rId3">
+            <a:blip>
               <a:extLst>
                 <a:ext uri="{28A0092B-C50C-407E-A947-70E740481C1C}">
                   <a14:useLocalDpi xmlns:a14="http://schemas.microsoft.com/office/drawing/2010/main" val="0"/>
@@ -22747,7 +22747,7 @@
             <p:nvPr/>
           </p:nvPicPr>
           <p:blipFill rotWithShape="1">
-            <a:blip r:embed="rId4">
+            <a:blip>
               <a:extLst>
                 <a:ext uri="{28A0092B-C50C-407E-A947-70E740481C1C}">
                   <a14:useLocalDpi xmlns:a14="http://schemas.microsoft.com/office/drawing/2010/main" val="0"/>
@@ -22868,7 +22868,7 @@
             <p:nvPr/>
           </p:nvPicPr>
           <p:blipFill rotWithShape="1">
-            <a:blip r:embed="rId3">
+            <a:blip>
               <a:extLst>
                 <a:ext uri="{28A0092B-C50C-407E-A947-70E740481C1C}">
                   <a14:useLocalDpi xmlns:a14="http://schemas.microsoft.com/office/drawing/2010/main" val="0"/>
@@ -22978,7 +22978,7 @@
           <p:nvPr/>
         </p:nvPicPr>
         <p:blipFill rotWithShape="1">
-          <a:blip r:embed="rId5">
+          <a:blip>
             <a:extLst>
               <a:ext uri="{28A0092B-C50C-407E-A947-70E740481C1C}">
                 <a14:useLocalDpi xmlns:a14="http://schemas.microsoft.com/office/drawing/2010/main" val="0"/>
@@ -23007,7 +23007,7 @@
           <p:nvPr/>
         </p:nvPicPr>
         <p:blipFill rotWithShape="1">
-          <a:blip r:embed="rId5">
+          <a:blip>
             <a:extLst>
               <a:ext uri="{28A0092B-C50C-407E-A947-70E740481C1C}">
                 <a14:useLocalDpi xmlns:a14="http://schemas.microsoft.com/office/drawing/2010/main" val="0"/>
@@ -24023,7 +24023,7 @@
           <p:nvPr/>
         </p:nvPicPr>
         <p:blipFill rotWithShape="1">
-          <a:blip r:embed="rId2">
+          <a:blip>
             <a:extLst>
               <a:ext uri="{28A0092B-C50C-407E-A947-70E740481C1C}">
                 <a14:useLocalDpi xmlns:a14="http://schemas.microsoft.com/office/drawing/2010/main" val="0"/>
@@ -24052,7 +24052,7 @@
           <p:nvPr/>
         </p:nvPicPr>
         <p:blipFill rotWithShape="1">
-          <a:blip r:embed="rId3">
+          <a:blip>
             <a:extLst>
               <a:ext uri="{28A0092B-C50C-407E-A947-70E740481C1C}">
                 <a14:useLocalDpi xmlns:a14="http://schemas.microsoft.com/office/drawing/2010/main" val="0"/>
@@ -24081,7 +24081,7 @@
           <p:nvPr/>
         </p:nvPicPr>
         <p:blipFill rotWithShape="1">
-          <a:blip r:embed="rId4">
+          <a:blip>
             <a:extLst>
               <a:ext uri="{28A0092B-C50C-407E-A947-70E740481C1C}">
                 <a14:useLocalDpi xmlns:a14="http://schemas.microsoft.com/office/drawing/2010/main" val="0"/>
@@ -27489,7 +27489,7 @@
           <p:nvPr/>
         </p:nvPicPr>
         <p:blipFill rotWithShape="1">
-          <a:blip r:embed="rId2">
+          <a:blip>
             <a:extLst>
               <a:ext uri="{28A0092B-C50C-407E-A947-70E740481C1C}">
                 <a14:useLocalDpi xmlns:a14="http://schemas.microsoft.com/office/drawing/2010/main" val="0"/>
@@ -27518,7 +27518,7 @@
           <p:nvPr/>
         </p:nvPicPr>
         <p:blipFill rotWithShape="1">
-          <a:blip r:embed="rId3">
+          <a:blip>
             <a:extLst>
               <a:ext uri="{28A0092B-C50C-407E-A947-70E740481C1C}">
                 <a14:useLocalDpi xmlns:a14="http://schemas.microsoft.com/office/drawing/2010/main" val="0"/>
@@ -27608,7 +27608,7 @@
           <p:nvPr/>
         </p:nvPicPr>
         <p:blipFill rotWithShape="1">
-          <a:blip r:embed="rId2">
+          <a:blip>
             <a:extLst>
               <a:ext uri="{28A0092B-C50C-407E-A947-70E740481C1C}">
                 <a14:useLocalDpi xmlns:a14="http://schemas.microsoft.com/office/drawing/2010/main" val="0"/>
@@ -27637,7 +27637,7 @@
           <p:nvPr/>
         </p:nvPicPr>
         <p:blipFill rotWithShape="1">
-          <a:blip r:embed="rId3">
+          <a:blip>
             <a:extLst>
               <a:ext uri="{28A0092B-C50C-407E-A947-70E740481C1C}">
                 <a14:useLocalDpi xmlns:a14="http://schemas.microsoft.com/office/drawing/2010/main" val="0"/>
@@ -27666,7 +27666,7 @@
           <p:nvPr/>
         </p:nvPicPr>
         <p:blipFill rotWithShape="1">
-          <a:blip r:embed="rId4">
+          <a:blip>
             <a:extLst>
               <a:ext uri="{28A0092B-C50C-407E-A947-70E740481C1C}">
                 <a14:useLocalDpi xmlns:a14="http://schemas.microsoft.com/office/drawing/2010/main" val="0"/>
@@ -31072,7 +31072,7 @@
           <p:nvPr/>
         </p:nvPicPr>
         <p:blipFill rotWithShape="1">
-          <a:blip r:embed="rId2">
+          <a:blip>
             <a:extLst>
               <a:ext uri="{28A0092B-C50C-407E-A947-70E740481C1C}">
                 <a14:useLocalDpi xmlns:a14="http://schemas.microsoft.com/office/drawing/2010/main" val="0"/>
@@ -31101,7 +31101,7 @@
           <p:nvPr/>
         </p:nvPicPr>
         <p:blipFill rotWithShape="1">
-          <a:blip r:embed="rId3">
+          <a:blip>
             <a:extLst>
               <a:ext uri="{28A0092B-C50C-407E-A947-70E740481C1C}">
                 <a14:useLocalDpi xmlns:a14="http://schemas.microsoft.com/office/drawing/2010/main" val="0"/>
@@ -31203,7 +31203,7 @@
           <p:nvPr/>
         </p:nvPicPr>
         <p:blipFill rotWithShape="1">
-          <a:blip r:embed="rId2">
+          <a:blip>
             <a:extLst>
               <a:ext uri="{28A0092B-C50C-407E-A947-70E740481C1C}">
                 <a14:useLocalDpi xmlns:a14="http://schemas.microsoft.com/office/drawing/2010/main" val="0"/>
@@ -31232,7 +31232,7 @@
           <p:nvPr/>
         </p:nvPicPr>
         <p:blipFill rotWithShape="1">
-          <a:blip r:embed="rId3">
+          <a:blip>
             <a:extLst>
               <a:ext uri="{28A0092B-C50C-407E-A947-70E740481C1C}">
                 <a14:useLocalDpi xmlns:a14="http://schemas.microsoft.com/office/drawing/2010/main" val="0"/>
@@ -31261,7 +31261,7 @@
           <p:nvPr/>
         </p:nvPicPr>
         <p:blipFill rotWithShape="1">
-          <a:blip r:embed="rId4">
+          <a:blip>
             <a:extLst>
               <a:ext uri="{28A0092B-C50C-407E-A947-70E740481C1C}">
                 <a14:useLocalDpi xmlns:a14="http://schemas.microsoft.com/office/drawing/2010/main" val="0"/>

</xml_diff>